<commit_message>
Developed backed API in python to filter data
</commit_message>
<xml_diff>
--- a/Draft Wireframe.pptx
+++ b/Draft Wireframe.pptx
@@ -260,7 +260,7 @@
           <a:p>
             <a:fld id="{2D019029-4D42-E641-9287-DF002A1210B4}" type="datetimeFigureOut">
               <a:rPr lang="en-US" smtClean="0"/>
-              <a:t>3/18/19</a:t>
+              <a:t>3/30/19</a:t>
             </a:fld>
             <a:endParaRPr lang="en-US"/>
           </a:p>
@@ -458,7 +458,7 @@
           <a:p>
             <a:fld id="{2D019029-4D42-E641-9287-DF002A1210B4}" type="datetimeFigureOut">
               <a:rPr lang="en-US" smtClean="0"/>
-              <a:t>3/18/19</a:t>
+              <a:t>3/30/19</a:t>
             </a:fld>
             <a:endParaRPr lang="en-US"/>
           </a:p>
@@ -666,7 +666,7 @@
           <a:p>
             <a:fld id="{2D019029-4D42-E641-9287-DF002A1210B4}" type="datetimeFigureOut">
               <a:rPr lang="en-US" smtClean="0"/>
-              <a:t>3/18/19</a:t>
+              <a:t>3/30/19</a:t>
             </a:fld>
             <a:endParaRPr lang="en-US"/>
           </a:p>
@@ -864,7 +864,7 @@
           <a:p>
             <a:fld id="{2D019029-4D42-E641-9287-DF002A1210B4}" type="datetimeFigureOut">
               <a:rPr lang="en-US" smtClean="0"/>
-              <a:t>3/18/19</a:t>
+              <a:t>3/30/19</a:t>
             </a:fld>
             <a:endParaRPr lang="en-US"/>
           </a:p>
@@ -1139,7 +1139,7 @@
           <a:p>
             <a:fld id="{2D019029-4D42-E641-9287-DF002A1210B4}" type="datetimeFigureOut">
               <a:rPr lang="en-US" smtClean="0"/>
-              <a:t>3/18/19</a:t>
+              <a:t>3/30/19</a:t>
             </a:fld>
             <a:endParaRPr lang="en-US"/>
           </a:p>
@@ -1404,7 +1404,7 @@
           <a:p>
             <a:fld id="{2D019029-4D42-E641-9287-DF002A1210B4}" type="datetimeFigureOut">
               <a:rPr lang="en-US" smtClean="0"/>
-              <a:t>3/18/19</a:t>
+              <a:t>3/30/19</a:t>
             </a:fld>
             <a:endParaRPr lang="en-US"/>
           </a:p>
@@ -1816,7 +1816,7 @@
           <a:p>
             <a:fld id="{2D019029-4D42-E641-9287-DF002A1210B4}" type="datetimeFigureOut">
               <a:rPr lang="en-US" smtClean="0"/>
-              <a:t>3/18/19</a:t>
+              <a:t>3/30/19</a:t>
             </a:fld>
             <a:endParaRPr lang="en-US"/>
           </a:p>
@@ -1957,7 +1957,7 @@
           <a:p>
             <a:fld id="{2D019029-4D42-E641-9287-DF002A1210B4}" type="datetimeFigureOut">
               <a:rPr lang="en-US" smtClean="0"/>
-              <a:t>3/18/19</a:t>
+              <a:t>3/30/19</a:t>
             </a:fld>
             <a:endParaRPr lang="en-US"/>
           </a:p>
@@ -2070,7 +2070,7 @@
           <a:p>
             <a:fld id="{2D019029-4D42-E641-9287-DF002A1210B4}" type="datetimeFigureOut">
               <a:rPr lang="en-US" smtClean="0"/>
-              <a:t>3/18/19</a:t>
+              <a:t>3/30/19</a:t>
             </a:fld>
             <a:endParaRPr lang="en-US"/>
           </a:p>
@@ -2381,7 +2381,7 @@
           <a:p>
             <a:fld id="{2D019029-4D42-E641-9287-DF002A1210B4}" type="datetimeFigureOut">
               <a:rPr lang="en-US" smtClean="0"/>
-              <a:t>3/18/19</a:t>
+              <a:t>3/30/19</a:t>
             </a:fld>
             <a:endParaRPr lang="en-US"/>
           </a:p>
@@ -2669,7 +2669,7 @@
           <a:p>
             <a:fld id="{2D019029-4D42-E641-9287-DF002A1210B4}" type="datetimeFigureOut">
               <a:rPr lang="en-US" smtClean="0"/>
-              <a:t>3/18/19</a:t>
+              <a:t>3/30/19</a:t>
             </a:fld>
             <a:endParaRPr lang="en-US"/>
           </a:p>
@@ -2910,7 +2910,7 @@
           <a:p>
             <a:fld id="{2D019029-4D42-E641-9287-DF002A1210B4}" type="datetimeFigureOut">
               <a:rPr lang="en-US" smtClean="0"/>
-              <a:t>3/18/19</a:t>
+              <a:t>3/30/19</a:t>
             </a:fld>
             <a:endParaRPr lang="en-US"/>
           </a:p>
@@ -3783,7 +3783,7 @@
         </p:nvSpPr>
         <p:spPr>
           <a:xfrm>
-            <a:off x="7706128" y="4185721"/>
+            <a:off x="6519876" y="4185721"/>
             <a:ext cx="2199503" cy="908221"/>
           </a:xfrm>
           <a:prstGeom prst="rect">
@@ -3830,7 +3830,7 @@
         </p:nvSpPr>
         <p:spPr>
           <a:xfrm>
-            <a:off x="7706129" y="4198075"/>
+            <a:off x="6519877" y="4198075"/>
             <a:ext cx="111211" cy="895864"/>
           </a:xfrm>
           <a:prstGeom prst="rect">
@@ -3867,10 +3867,10 @@
       </p:sp>
       <p:sp>
         <p:nvSpPr>
-          <p:cNvPr id="27" name="Rectangle 26">
-            <a:extLst>
-              <a:ext uri="{FF2B5EF4-FFF2-40B4-BE49-F238E27FC236}">
-                <a16:creationId xmlns:a16="http://schemas.microsoft.com/office/drawing/2014/main" id="{D0871C3D-594A-1141-8CA2-3D862936EB78}"/>
+          <p:cNvPr id="29" name="Rectangle 28">
+            <a:extLst>
+              <a:ext uri="{FF2B5EF4-FFF2-40B4-BE49-F238E27FC236}">
+                <a16:creationId xmlns:a16="http://schemas.microsoft.com/office/drawing/2014/main" id="{3D4348ED-1498-B44B-ABD3-BB9AB98F16ED}"/>
               </a:ext>
             </a:extLst>
           </p:cNvPr>
@@ -3879,7 +3879,7 @@
         </p:nvSpPr>
         <p:spPr>
           <a:xfrm>
-            <a:off x="4967033" y="4193961"/>
+            <a:off x="3590921" y="4185721"/>
             <a:ext cx="2199503" cy="908221"/>
           </a:xfrm>
           <a:prstGeom prst="rect">
@@ -3907,17 +3907,17 @@
             <a:pPr algn="ctr"/>
             <a:r>
               <a:rPr lang="en-US" dirty="0"/>
-              <a:t>Flood</a:t>
-            </a:r>
-          </a:p>
-        </p:txBody>
-      </p:sp>
-      <p:sp>
-        <p:nvSpPr>
-          <p:cNvPr id="28" name="Rectangle 27">
-            <a:extLst>
-              <a:ext uri="{FF2B5EF4-FFF2-40B4-BE49-F238E27FC236}">
-                <a16:creationId xmlns:a16="http://schemas.microsoft.com/office/drawing/2014/main" id="{1E468E00-11B8-D84B-BE6C-B5DBB2EB2770}"/>
+              <a:t>Storm</a:t>
+            </a:r>
+          </a:p>
+        </p:txBody>
+      </p:sp>
+      <p:sp>
+        <p:nvSpPr>
+          <p:cNvPr id="30" name="Rectangle 29">
+            <a:extLst>
+              <a:ext uri="{FF2B5EF4-FFF2-40B4-BE49-F238E27FC236}">
+                <a16:creationId xmlns:a16="http://schemas.microsoft.com/office/drawing/2014/main" id="{F050BB39-3337-2041-AD2D-76DCDFA2FB13}"/>
               </a:ext>
             </a:extLst>
           </p:cNvPr>
@@ -3926,103 +3926,7 @@
         </p:nvSpPr>
         <p:spPr>
           <a:xfrm>
-            <a:off x="4967034" y="4206315"/>
-            <a:ext cx="111211" cy="895864"/>
-          </a:xfrm>
-          <a:prstGeom prst="rect">
-            <a:avLst/>
-          </a:prstGeom>
-          <a:solidFill>
-            <a:schemeClr val="accent6"/>
-          </a:solidFill>
-        </p:spPr>
-        <p:style>
-          <a:lnRef idx="2">
-            <a:schemeClr val="accent1">
-              <a:shade val="50000"/>
-            </a:schemeClr>
-          </a:lnRef>
-          <a:fillRef idx="1">
-            <a:schemeClr val="accent1"/>
-          </a:fillRef>
-          <a:effectRef idx="0">
-            <a:schemeClr val="accent1"/>
-          </a:effectRef>
-          <a:fontRef idx="minor">
-            <a:schemeClr val="lt1"/>
-          </a:fontRef>
-        </p:style>
-        <p:txBody>
-          <a:bodyPr rtlCol="0" anchor="ctr"/>
-          <a:lstStyle/>
-          <a:p>
-            <a:pPr algn="ctr"/>
-            <a:endParaRPr lang="en-US"/>
-          </a:p>
-        </p:txBody>
-      </p:sp>
-      <p:sp>
-        <p:nvSpPr>
-          <p:cNvPr id="29" name="Rectangle 28">
-            <a:extLst>
-              <a:ext uri="{FF2B5EF4-FFF2-40B4-BE49-F238E27FC236}">
-                <a16:creationId xmlns:a16="http://schemas.microsoft.com/office/drawing/2014/main" id="{3D4348ED-1498-B44B-ABD3-BB9AB98F16ED}"/>
-              </a:ext>
-            </a:extLst>
-          </p:cNvPr>
-          <p:cNvSpPr/>
-          <p:nvPr/>
-        </p:nvSpPr>
-        <p:spPr>
-          <a:xfrm>
-            <a:off x="2289730" y="4185721"/>
-            <a:ext cx="2199503" cy="908221"/>
-          </a:xfrm>
-          <a:prstGeom prst="rect">
-            <a:avLst/>
-          </a:prstGeom>
-        </p:spPr>
-        <p:style>
-          <a:lnRef idx="2">
-            <a:schemeClr val="accent6"/>
-          </a:lnRef>
-          <a:fillRef idx="1">
-            <a:schemeClr val="lt1"/>
-          </a:fillRef>
-          <a:effectRef idx="0">
-            <a:schemeClr val="accent6"/>
-          </a:effectRef>
-          <a:fontRef idx="minor">
-            <a:schemeClr val="dk1"/>
-          </a:fontRef>
-        </p:style>
-        <p:txBody>
-          <a:bodyPr rtlCol="0" anchor="ctr"/>
-          <a:lstStyle/>
-          <a:p>
-            <a:pPr algn="ctr"/>
-            <a:r>
-              <a:rPr lang="en-US" dirty="0"/>
-              <a:t>Storm</a:t>
-            </a:r>
-          </a:p>
-        </p:txBody>
-      </p:sp>
-      <p:sp>
-        <p:nvSpPr>
-          <p:cNvPr id="30" name="Rectangle 29">
-            <a:extLst>
-              <a:ext uri="{FF2B5EF4-FFF2-40B4-BE49-F238E27FC236}">
-                <a16:creationId xmlns:a16="http://schemas.microsoft.com/office/drawing/2014/main" id="{F050BB39-3337-2041-AD2D-76DCDFA2FB13}"/>
-              </a:ext>
-            </a:extLst>
-          </p:cNvPr>
-          <p:cNvSpPr/>
-          <p:nvPr/>
-        </p:nvSpPr>
-        <p:spPr>
-          <a:xfrm>
-            <a:off x="2289731" y="4198075"/>
+            <a:off x="3590920" y="4193960"/>
             <a:ext cx="111211" cy="895864"/>
           </a:xfrm>
           <a:prstGeom prst="rect">

</xml_diff>